<commit_message>
Updated recommendations with Rabi TIA
</commit_message>
<xml_diff>
--- a/Presentations/4Colloquium.pptx
+++ b/Presentations/4Colloquium.pptx
@@ -8,10 +8,10 @@
     <p:sldMasterId id="2147483714" r:id="rId4"/>
   </p:sldMasterIdLst>
   <p:notesMasterIdLst>
-    <p:notesMasterId r:id="rId26"/>
+    <p:notesMasterId r:id="rId25"/>
   </p:notesMasterIdLst>
   <p:handoutMasterIdLst>
-    <p:handoutMasterId r:id="rId27"/>
+    <p:handoutMasterId r:id="rId26"/>
   </p:handoutMasterIdLst>
   <p:sldIdLst>
     <p:sldId id="256" r:id="rId5"/>
@@ -34,7 +34,6 @@
     <p:sldId id="338" r:id="rId22"/>
     <p:sldId id="337" r:id="rId23"/>
     <p:sldId id="339" r:id="rId24"/>
-    <p:sldId id="324" r:id="rId25"/>
   </p:sldIdLst>
   <p:sldSz cx="12192000" cy="6858000"/>
   <p:notesSz cx="6858000" cy="9144000"/>
@@ -238,7 +237,7 @@
           <a:p>
             <a:fld id="{B488245A-DF20-4648-8DEA-5EEF7F9EF1B5}" type="datetimeFigureOut">
               <a:rPr lang="en-NL" smtClean="0"/>
-              <a:t>15 Jan 2026</a:t>
+              <a:t>21 Jan 2026</a:t>
             </a:fld>
             <a:endParaRPr lang="en-NL"/>
           </a:p>
@@ -415,7 +414,7 @@
           <a:p>
             <a:fld id="{6E789EEE-78C3-47ED-9B8C-CC5637E83F9E}" type="datetimeFigureOut">
               <a:rPr lang="en-NL" smtClean="0"/>
-              <a:t>15 Jan 2026</a:t>
+              <a:t>21 Jan 2026</a:t>
             </a:fld>
             <a:endParaRPr lang="en-NL"/>
           </a:p>
@@ -809,98 +808,6 @@
     <p:extLst>
       <p:ext uri="{BB962C8B-B14F-4D97-AF65-F5344CB8AC3E}">
         <p14:creationId xmlns:p14="http://schemas.microsoft.com/office/powerpoint/2010/main" val="811607142"/>
-      </p:ext>
-    </p:extLst>
-  </p:cSld>
-  <p:clrMapOvr>
-    <a:masterClrMapping/>
-  </p:clrMapOvr>
-</p:notes>
-</file>
-
-<file path=ppt/notesSlides/notesSlide10.xml><?xml version="1.0" encoding="utf-8"?>
-<p:notes xmlns:a="http://schemas.openxmlformats.org/drawingml/2006/main" xmlns:r="http://schemas.openxmlformats.org/officeDocument/2006/relationships" xmlns:p="http://schemas.openxmlformats.org/presentationml/2006/main">
-  <p:cSld>
-    <p:spTree>
-      <p:nvGrpSpPr>
-        <p:cNvPr id="1" name=""/>
-        <p:cNvGrpSpPr/>
-        <p:nvPr/>
-      </p:nvGrpSpPr>
-      <p:grpSpPr>
-        <a:xfrm>
-          <a:off x="0" y="0"/>
-          <a:ext cx="0" cy="0"/>
-          <a:chOff x="0" y="0"/>
-          <a:chExt cx="0" cy="0"/>
-        </a:xfrm>
-      </p:grpSpPr>
-      <p:sp>
-        <p:nvSpPr>
-          <p:cNvPr id="2" name="Slide Image Placeholder 1"/>
-          <p:cNvSpPr>
-            <a:spLocks noGrp="1" noRot="1" noChangeAspect="1"/>
-          </p:cNvSpPr>
-          <p:nvPr>
-            <p:ph type="sldImg"/>
-          </p:nvPr>
-        </p:nvSpPr>
-        <p:spPr/>
-      </p:sp>
-      <p:sp>
-        <p:nvSpPr>
-          <p:cNvPr id="3" name="Notes Placeholder 2"/>
-          <p:cNvSpPr>
-            <a:spLocks noGrp="1"/>
-          </p:cNvSpPr>
-          <p:nvPr>
-            <p:ph type="body" idx="1"/>
-          </p:nvPr>
-        </p:nvSpPr>
-        <p:spPr/>
-        <p:txBody>
-          <a:bodyPr/>
-          <a:lstStyle/>
-          <a:p>
-            <a:r>
-              <a:rPr lang="en-US" dirty="0"/>
-              <a:t>Replacing diode with another PIN diode, which is less sensitive to green, will result in less laser light present in the readings. Increasing the bandwidth can be done </a:t>
-            </a:r>
-            <a:r>
-              <a:rPr lang="en-US"/>
-              <a:t>by changing </a:t>
-            </a:r>
-            <a:endParaRPr lang="en-NL" dirty="0"/>
-          </a:p>
-        </p:txBody>
-      </p:sp>
-      <p:sp>
-        <p:nvSpPr>
-          <p:cNvPr id="4" name="Slide Number Placeholder 3"/>
-          <p:cNvSpPr>
-            <a:spLocks noGrp="1"/>
-          </p:cNvSpPr>
-          <p:nvPr>
-            <p:ph type="sldNum" sz="quarter" idx="5"/>
-          </p:nvPr>
-        </p:nvSpPr>
-        <p:spPr/>
-        <p:txBody>
-          <a:bodyPr/>
-          <a:lstStyle/>
-          <a:p>
-            <a:fld id="{A9231E3D-0C33-46E2-9D47-2F079CA6FAED}" type="slidenum">
-              <a:rPr lang="en-NL" smtClean="0"/>
-              <a:t>21</a:t>
-            </a:fld>
-            <a:endParaRPr lang="en-NL"/>
-          </a:p>
-        </p:txBody>
-      </p:sp>
-    </p:spTree>
-    <p:extLst>
-      <p:ext uri="{BB962C8B-B14F-4D97-AF65-F5344CB8AC3E}">
-        <p14:creationId xmlns:p14="http://schemas.microsoft.com/office/powerpoint/2010/main" val="219336459"/>
       </p:ext>
     </p:extLst>
   </p:cSld>
@@ -29344,7 +29251,7 @@
 </file>
 
 <file path=ppt/slides/slide10.xml><?xml version="1.0" encoding="utf-8"?>
-<p:sld xmlns:a="http://schemas.openxmlformats.org/drawingml/2006/main" xmlns:r="http://schemas.openxmlformats.org/officeDocument/2006/relationships" xmlns:p="http://schemas.openxmlformats.org/presentationml/2006/main">
+<p:sld xmlns:a="http://schemas.openxmlformats.org/drawingml/2006/main" xmlns:r="http://schemas.openxmlformats.org/officeDocument/2006/relationships" xmlns:p="http://schemas.openxmlformats.org/presentationml/2006/main" show="0">
   <p:cSld>
     <p:spTree>
       <p:nvGrpSpPr>
@@ -29440,7 +29347,7 @@
 </file>
 
 <file path=ppt/slides/slide11.xml><?xml version="1.0" encoding="utf-8"?>
-<p:sld xmlns:a="http://schemas.openxmlformats.org/drawingml/2006/main" xmlns:r="http://schemas.openxmlformats.org/officeDocument/2006/relationships" xmlns:p="http://schemas.openxmlformats.org/presentationml/2006/main">
+<p:sld xmlns:a="http://schemas.openxmlformats.org/drawingml/2006/main" xmlns:r="http://schemas.openxmlformats.org/officeDocument/2006/relationships" xmlns:p="http://schemas.openxmlformats.org/presentationml/2006/main" show="0">
   <p:cSld>
     <p:spTree>
       <p:nvGrpSpPr>
@@ -29518,7 +29425,7 @@
         <p:spPr>
           <a:xfrm>
             <a:off x="481617" y="1939507"/>
-            <a:ext cx="4853957" cy="3868694"/>
+            <a:ext cx="5031943" cy="4010552"/>
           </a:xfrm>
         </p:spPr>
       </p:pic>
@@ -29551,8 +29458,8 @@
         </p:blipFill>
         <p:spPr>
           <a:xfrm>
-            <a:off x="6422642" y="1873675"/>
-            <a:ext cx="4740281" cy="3868694"/>
+            <a:off x="6255946" y="1873674"/>
+            <a:ext cx="4906978" cy="4004741"/>
           </a:xfrm>
           <a:prstGeom prst="rect">
             <a:avLst/>
@@ -29573,7 +29480,7 @@
 </file>
 
 <file path=ppt/slides/slide12.xml><?xml version="1.0" encoding="utf-8"?>
-<p:sld xmlns:a="http://schemas.openxmlformats.org/drawingml/2006/main" xmlns:r="http://schemas.openxmlformats.org/officeDocument/2006/relationships" xmlns:p="http://schemas.openxmlformats.org/presentationml/2006/main">
+<p:sld xmlns:a="http://schemas.openxmlformats.org/drawingml/2006/main" xmlns:r="http://schemas.openxmlformats.org/officeDocument/2006/relationships" xmlns:p="http://schemas.openxmlformats.org/presentationml/2006/main" show="0">
   <p:cSld>
     <p:spTree>
       <p:nvGrpSpPr>
@@ -29618,8 +29525,8 @@
         </p:blipFill>
         <p:spPr>
           <a:xfrm>
-            <a:off x="6263688" y="1939506"/>
-            <a:ext cx="4717800" cy="3701958"/>
+            <a:off x="5884752" y="1939505"/>
+            <a:ext cx="5096736" cy="3999301"/>
           </a:xfrm>
           <a:prstGeom prst="rect">
             <a:avLst/>
@@ -29655,8 +29562,8 @@
         </p:blipFill>
         <p:spPr>
           <a:xfrm>
-            <a:off x="540000" y="1939506"/>
-            <a:ext cx="4717800" cy="3783885"/>
+            <a:off x="539999" y="1939506"/>
+            <a:ext cx="4982615" cy="3996278"/>
           </a:xfrm>
           <a:prstGeom prst="rect">
             <a:avLst/>
@@ -29715,7 +29622,7 @@
 </file>
 
 <file path=ppt/slides/slide13.xml><?xml version="1.0" encoding="utf-8"?>
-<p:sld xmlns:a="http://schemas.openxmlformats.org/drawingml/2006/main" xmlns:r="http://schemas.openxmlformats.org/officeDocument/2006/relationships" xmlns:p="http://schemas.openxmlformats.org/presentationml/2006/main">
+<p:sld xmlns:a="http://schemas.openxmlformats.org/drawingml/2006/main" xmlns:r="http://schemas.openxmlformats.org/officeDocument/2006/relationships" xmlns:p="http://schemas.openxmlformats.org/presentationml/2006/main" show="0">
   <p:cSld>
     <p:spTree>
       <p:nvGrpSpPr>
@@ -29848,7 +29755,7 @@
 </file>
 
 <file path=ppt/slides/slide14.xml><?xml version="1.0" encoding="utf-8"?>
-<p:sld xmlns:a="http://schemas.openxmlformats.org/drawingml/2006/main" xmlns:r="http://schemas.openxmlformats.org/officeDocument/2006/relationships" xmlns:p="http://schemas.openxmlformats.org/presentationml/2006/main">
+<p:sld xmlns:a="http://schemas.openxmlformats.org/drawingml/2006/main" xmlns:r="http://schemas.openxmlformats.org/officeDocument/2006/relationships" xmlns:p="http://schemas.openxmlformats.org/presentationml/2006/main" show="0">
   <p:cSld>
     <p:spTree>
       <p:nvGrpSpPr>
@@ -30049,7 +29956,7 @@
           <p:nvPr>
             <p:extLst>
               <p:ext uri="{D42A27DB-BD31-4B8C-83A1-F6EECF244321}">
-                <p14:modId xmlns:p14="http://schemas.microsoft.com/office/powerpoint/2010/main" val="754013043"/>
+                <p14:modId xmlns:p14="http://schemas.microsoft.com/office/powerpoint/2010/main" val="4113316758"/>
               </p:ext>
             </p:extLst>
           </p:nvPr>
@@ -30351,6 +30258,17 @@
                         <a:rPr lang="en-US" dirty="0"/>
                         <a:t>Non-inverting</a:t>
                       </a:r>
+                      <a:r>
+                        <a:rPr lang="en-NL" dirty="0"/>
+                        <a:t>,</a:t>
+                      </a:r>
+                    </a:p>
+                    <a:p>
+                      <a:pPr algn="ctr"/>
+                      <a:r>
+                        <a:rPr lang="en-US" dirty="0"/>
+                        <a:t>cascaded</a:t>
+                      </a:r>
                       <a:endParaRPr lang="en-NL" dirty="0"/>
                     </a:p>
                   </a:txBody>
@@ -30447,7 +30365,7 @@
                       <a:pPr algn="ctr"/>
                       <a:r>
                         <a:rPr lang="en-US" dirty="0"/>
-                        <a:t>Non-inverting, cascaded</a:t>
+                        <a:t>Non-inverting</a:t>
                       </a:r>
                       <a:endParaRPr lang="en-NL" dirty="0"/>
                     </a:p>
@@ -30513,7 +30431,7 @@
 </file>
 
 <file path=ppt/slides/slide16.xml><?xml version="1.0" encoding="utf-8"?>
-<p:sld xmlns:a="http://schemas.openxmlformats.org/drawingml/2006/main" xmlns:r="http://schemas.openxmlformats.org/officeDocument/2006/relationships" xmlns:p="http://schemas.openxmlformats.org/presentationml/2006/main">
+<p:sld xmlns:a="http://schemas.openxmlformats.org/drawingml/2006/main" xmlns:r="http://schemas.openxmlformats.org/officeDocument/2006/relationships" xmlns:p="http://schemas.openxmlformats.org/presentationml/2006/main" show="0">
   <p:cSld>
     <p:spTree>
       <p:nvGrpSpPr>
@@ -30726,7 +30644,7 @@
 </file>
 
 <file path=ppt/slides/slide17.xml><?xml version="1.0" encoding="utf-8"?>
-<p:sld xmlns:a="http://schemas.openxmlformats.org/drawingml/2006/main" xmlns:r="http://schemas.openxmlformats.org/officeDocument/2006/relationships" xmlns:p="http://schemas.openxmlformats.org/presentationml/2006/main">
+<p:sld xmlns:a="http://schemas.openxmlformats.org/drawingml/2006/main" xmlns:r="http://schemas.openxmlformats.org/officeDocument/2006/relationships" xmlns:p="http://schemas.openxmlformats.org/presentationml/2006/main" show="0">
   <p:cSld>
     <p:spTree>
       <p:nvGrpSpPr>
@@ -31691,134 +31609,6 @@
 </p:sld>
 </file>
 
-<file path=ppt/slides/slide21.xml><?xml version="1.0" encoding="utf-8"?>
-<p:sld xmlns:a="http://schemas.openxmlformats.org/drawingml/2006/main" xmlns:r="http://schemas.openxmlformats.org/officeDocument/2006/relationships" xmlns:p="http://schemas.openxmlformats.org/presentationml/2006/main">
-  <p:cSld>
-    <p:spTree>
-      <p:nvGrpSpPr>
-        <p:cNvPr id="1" name=""/>
-        <p:cNvGrpSpPr/>
-        <p:nvPr/>
-      </p:nvGrpSpPr>
-      <p:grpSpPr>
-        <a:xfrm>
-          <a:off x="0" y="0"/>
-          <a:ext cx="0" cy="0"/>
-          <a:chOff x="0" y="0"/>
-          <a:chExt cx="0" cy="0"/>
-        </a:xfrm>
-      </p:grpSpPr>
-      <p:sp>
-        <p:nvSpPr>
-          <p:cNvPr id="10" name="Title 1">
-            <a:extLst>
-              <a:ext uri="{FF2B5EF4-FFF2-40B4-BE49-F238E27FC236}">
-                <a16:creationId xmlns:a16="http://schemas.microsoft.com/office/drawing/2014/main" id="{C084D7B8-3ED4-5E7E-CD08-46C0C1E1B3F3}"/>
-              </a:ext>
-            </a:extLst>
-          </p:cNvPr>
-          <p:cNvSpPr>
-            <a:spLocks noGrp="1"/>
-          </p:cNvSpPr>
-          <p:nvPr>
-            <p:ph type="title"/>
-          </p:nvPr>
-        </p:nvSpPr>
-        <p:spPr>
-          <a:xfrm>
-            <a:off x="540000" y="504000"/>
-            <a:ext cx="11102400" cy="1435507"/>
-          </a:xfrm>
-        </p:spPr>
-        <p:txBody>
-          <a:bodyPr/>
-          <a:lstStyle/>
-          <a:p>
-            <a:pPr algn="ctr"/>
-            <a:r>
-              <a:rPr lang="en-US" dirty="0"/>
-              <a:t>Recommendations</a:t>
-            </a:r>
-          </a:p>
-        </p:txBody>
-      </p:sp>
-      <p:sp>
-        <p:nvSpPr>
-          <p:cNvPr id="11" name="Text Placeholder 2">
-            <a:extLst>
-              <a:ext uri="{FF2B5EF4-FFF2-40B4-BE49-F238E27FC236}">
-                <a16:creationId xmlns:a16="http://schemas.microsoft.com/office/drawing/2014/main" id="{2895A74C-9E60-7E2A-0CB6-EFF35830AA08}"/>
-              </a:ext>
-            </a:extLst>
-          </p:cNvPr>
-          <p:cNvSpPr>
-            <a:spLocks noGrp="1"/>
-          </p:cNvSpPr>
-          <p:nvPr>
-            <p:ph type="body" sz="quarter" idx="10"/>
-          </p:nvPr>
-        </p:nvSpPr>
-        <p:spPr>
-          <a:xfrm>
-            <a:off x="540000" y="2520000"/>
-            <a:ext cx="11080800" cy="3063600"/>
-          </a:xfrm>
-        </p:spPr>
-        <p:txBody>
-          <a:bodyPr/>
-          <a:lstStyle/>
-          <a:p>
-            <a:pPr marL="457200" indent="-457200">
-              <a:buFont typeface="Arial" panose="020B0604020202020204" pitchFamily="34" charset="0"/>
-              <a:buChar char="•"/>
-            </a:pPr>
-            <a:r>
-              <a:rPr lang="en-US" dirty="0"/>
-              <a:t>Consider replacing diode</a:t>
-            </a:r>
-          </a:p>
-          <a:p>
-            <a:pPr marL="457200" indent="-457200">
-              <a:buFont typeface="Arial" panose="020B0604020202020204" pitchFamily="34" charset="0"/>
-              <a:buChar char="•"/>
-            </a:pPr>
-            <a:r>
-              <a:rPr lang="en-US" dirty="0"/>
-              <a:t>Increase bandwidth to detect Rabi oscillations</a:t>
-            </a:r>
-          </a:p>
-          <a:p>
-            <a:pPr marL="457200" indent="-457200">
-              <a:buFont typeface="Arial" panose="020B0604020202020204" pitchFamily="34" charset="0"/>
-              <a:buChar char="•"/>
-            </a:pPr>
-            <a:r>
-              <a:rPr lang="en-US" dirty="0"/>
-              <a:t>Filter out the laser better</a:t>
-            </a:r>
-          </a:p>
-          <a:p>
-            <a:pPr marL="457200" indent="-457200">
-              <a:buFont typeface="Arial" panose="020B0604020202020204" pitchFamily="34" charset="0"/>
-              <a:buChar char="•"/>
-            </a:pPr>
-            <a:endParaRPr lang="en-US" dirty="0"/>
-          </a:p>
-        </p:txBody>
-      </p:sp>
-    </p:spTree>
-    <p:extLst>
-      <p:ext uri="{BB962C8B-B14F-4D97-AF65-F5344CB8AC3E}">
-        <p14:creationId xmlns:p14="http://schemas.microsoft.com/office/powerpoint/2010/main" val="1215134750"/>
-      </p:ext>
-    </p:extLst>
-  </p:cSld>
-  <p:clrMapOvr>
-    <a:masterClrMapping/>
-  </p:clrMapOvr>
-</p:sld>
-</file>
-
 <file path=ppt/slides/slide3.xml><?xml version="1.0" encoding="utf-8"?>
 <p:sld xmlns:a="http://schemas.openxmlformats.org/drawingml/2006/main" xmlns:r="http://schemas.openxmlformats.org/officeDocument/2006/relationships" xmlns:p="http://schemas.openxmlformats.org/presentationml/2006/main">
   <p:cSld>
@@ -32467,19 +32257,11 @@
               <a:buChar char="•"/>
             </a:pPr>
             <a:r>
-              <a:rPr lang="en-US" dirty="0">
-                <a:solidFill>
-                  <a:schemeClr val="bg1"/>
-                </a:solidFill>
-              </a:rPr>
-              <a:t>Gain-setting resistor R</a:t>
-            </a:r>
-            <a:r>
-              <a:rPr lang="en-US" baseline="-25000" dirty="0">
-                <a:solidFill>
-                  <a:schemeClr val="bg1"/>
-                </a:solidFill>
-              </a:rPr>
+              <a:rPr lang="en-US" dirty="0"/>
+              <a:t>Photodiode D</a:t>
+            </a:r>
+            <a:r>
+              <a:rPr lang="en-US" baseline="-25000" dirty="0"/>
               <a:t>1</a:t>
             </a:r>
             <a:endParaRPr lang="en-US" dirty="0">
@@ -32494,13 +32276,26 @@
               <a:buChar char="•"/>
             </a:pPr>
             <a:r>
-              <a:rPr lang="en-US" dirty="0"/>
-              <a:t>Compensation capacitor C</a:t>
-            </a:r>
-            <a:r>
-              <a:rPr lang="en-US" baseline="-25000" dirty="0"/>
+              <a:rPr lang="en-US" dirty="0">
+                <a:solidFill>
+                  <a:schemeClr val="bg1"/>
+                </a:solidFill>
+              </a:rPr>
+              <a:t>Gain-setting resistor R</a:t>
+            </a:r>
+            <a:r>
+              <a:rPr lang="en-US" baseline="-25000" dirty="0">
+                <a:solidFill>
+                  <a:schemeClr val="bg1"/>
+                </a:solidFill>
+              </a:rPr>
               <a:t>1</a:t>
             </a:r>
+            <a:endParaRPr lang="en-US" dirty="0">
+              <a:solidFill>
+                <a:schemeClr val="bg1"/>
+              </a:solidFill>
+            </a:endParaRPr>
           </a:p>
           <a:p>
             <a:pPr marL="285750" indent="-285750">
@@ -32509,13 +32304,12 @@
             </a:pPr>
             <a:r>
               <a:rPr lang="en-US" dirty="0"/>
-              <a:t>Photodiode D</a:t>
+              <a:t>Compensation capacitor C</a:t>
             </a:r>
             <a:r>
               <a:rPr lang="en-US" baseline="-25000" dirty="0"/>
               <a:t>1</a:t>
             </a:r>
-            <a:endParaRPr lang="en-US" dirty="0"/>
           </a:p>
           <a:p>
             <a:pPr marL="285750" indent="-285750">
@@ -32634,7 +32428,7 @@
                   <a:schemeClr val="bg1"/>
                 </a:solidFill>
               </a:rPr>
-              <a:t>Photoconductive mode</a:t>
+              <a:t>Photoconductive (PC) mode</a:t>
             </a:r>
           </a:p>
           <a:p>
@@ -32686,7 +32480,7 @@
             </a:pPr>
             <a:r>
               <a:rPr lang="en-US" dirty="0"/>
-              <a:t>Photovoltaic mode</a:t>
+              <a:t>Photovoltaic (PV) mode</a:t>
             </a:r>
           </a:p>
           <a:p>
@@ -32812,6 +32606,78 @@
           </a:prstGeom>
         </p:spPr>
       </p:pic>
+      <p:sp>
+        <p:nvSpPr>
+          <p:cNvPr id="3" name="TextBox 2">
+            <a:extLst>
+              <a:ext uri="{FF2B5EF4-FFF2-40B4-BE49-F238E27FC236}">
+                <a16:creationId xmlns:a16="http://schemas.microsoft.com/office/drawing/2014/main" id="{2F24A8E8-8DB6-1EEB-E521-D775E6E1498E}"/>
+              </a:ext>
+            </a:extLst>
+          </p:cNvPr>
+          <p:cNvSpPr txBox="1"/>
+          <p:nvPr/>
+        </p:nvSpPr>
+        <p:spPr>
+          <a:xfrm>
+            <a:off x="5881734" y="754693"/>
+            <a:ext cx="428531" cy="369332"/>
+          </a:xfrm>
+          <a:prstGeom prst="rect">
+            <a:avLst/>
+          </a:prstGeom>
+          <a:noFill/>
+        </p:spPr>
+        <p:txBody>
+          <a:bodyPr wrap="square" rtlCol="0">
+            <a:spAutoFit/>
+          </a:bodyPr>
+          <a:lstStyle/>
+          <a:p>
+            <a:r>
+              <a:rPr lang="en-US" u="sng" dirty="0"/>
+              <a:t>PC</a:t>
+            </a:r>
+            <a:endParaRPr lang="en-NL" u="sng" dirty="0"/>
+          </a:p>
+        </p:txBody>
+      </p:sp>
+      <p:sp>
+        <p:nvSpPr>
+          <p:cNvPr id="5" name="TextBox 4">
+            <a:extLst>
+              <a:ext uri="{FF2B5EF4-FFF2-40B4-BE49-F238E27FC236}">
+                <a16:creationId xmlns:a16="http://schemas.microsoft.com/office/drawing/2014/main" id="{3695BD60-D3E7-49BE-05EA-CA2F68259CBF}"/>
+              </a:ext>
+            </a:extLst>
+          </p:cNvPr>
+          <p:cNvSpPr txBox="1"/>
+          <p:nvPr/>
+        </p:nvSpPr>
+        <p:spPr>
+          <a:xfrm>
+            <a:off x="9956023" y="767002"/>
+            <a:ext cx="518836" cy="369332"/>
+          </a:xfrm>
+          <a:prstGeom prst="rect">
+            <a:avLst/>
+          </a:prstGeom>
+          <a:noFill/>
+        </p:spPr>
+        <p:txBody>
+          <a:bodyPr wrap="square" rtlCol="0">
+            <a:spAutoFit/>
+          </a:bodyPr>
+          <a:lstStyle/>
+          <a:p>
+            <a:r>
+              <a:rPr lang="en-US" u="sng" dirty="0"/>
+              <a:t>PV</a:t>
+            </a:r>
+            <a:endParaRPr lang="en-NL" u="sng" dirty="0"/>
+          </a:p>
+        </p:txBody>
+      </p:sp>
     </p:spTree>
     <p:extLst>
       <p:ext uri="{BB962C8B-B14F-4D97-AF65-F5344CB8AC3E}">

</xml_diff>